<commit_message>
Grammar fix in camel presentation
</commit_message>
<xml_diff>
--- a/CamelPresentationITWeek2017.pptx
+++ b/CamelPresentationITWeek2017.pptx
@@ -499,7 +499,7 @@
             <a:fld id="{7F5E9BF7-95E4-A242-BA1D-05FDCF603BE6}" type="datetime1">
               <a:rPr lang="en-US" smtClean="0"/>
               <a:pPr/>
-              <a:t>3/20/2017</a:t>
+              <a:t>4/5/2017</a:t>
             </a:fld>
             <a:endParaRPr lang="en-US"/>
           </a:p>
@@ -667,7 +667,7 @@
             <a:fld id="{165DBCB1-0306-AD41-9452-11E7C08D5C04}" type="datetime1">
               <a:rPr lang="en-US" smtClean="0"/>
               <a:pPr/>
-              <a:t>3/20/2017</a:t>
+              <a:t>4/5/2017</a:t>
             </a:fld>
             <a:endParaRPr lang="en-US"/>
           </a:p>
@@ -2059,15 +2059,7 @@
             </a:pPr>
             <a:r>
               <a:rPr lang="en-US" baseline="0" dirty="0" smtClean="0"/>
-              <a:t>Ok, let’s imagine producer stores record about order in DB and sends message about order to </a:t>
-            </a:r>
-            <a:r>
-              <a:rPr lang="en-US" baseline="0" dirty="0" smtClean="0"/>
-              <a:t>consumer. </a:t>
-            </a:r>
-            <a:r>
-              <a:rPr lang="en-US" baseline="0" dirty="0" smtClean="0"/>
-              <a:t>Consumer reads record from DB and does something with it. </a:t>
+              <a:t>Ok, let’s imagine producer stores record about order in DB and sends message about order to consumer. Consumer reads record from DB and does something with it. </a:t>
             </a:r>
             <a:endParaRPr lang="ru-RU" dirty="0" smtClean="0"/>
           </a:p>
@@ -2432,11 +2424,7 @@
             </a:pPr>
             <a:r>
               <a:rPr lang="en-US" baseline="0" dirty="0" smtClean="0"/>
-              <a:t>If </a:t>
-            </a:r>
-            <a:r>
-              <a:rPr lang="en-US" baseline="0" dirty="0" smtClean="0"/>
-              <a:t>you are not familiar with Camel, hopefully short introduction gives you insight on what it is, how it helps to deal with </a:t>
+              <a:t>If you are not familiar with Camel, hopefully short introduction gives you insight on what it is, how it helps to deal with </a:t>
             </a:r>
             <a:r>
               <a:rPr lang="en-US" baseline="0" dirty="0" err="1" smtClean="0"/>
@@ -2551,11 +2539,7 @@
           <a:p>
             <a:r>
               <a:rPr lang="en-US" baseline="0" dirty="0" smtClean="0"/>
-              <a:t>The issue is attempt to send message after stop signal will result in exception what is probably not what we want</a:t>
-            </a:r>
-            <a:r>
-              <a:rPr lang="en-US" baseline="0" dirty="0" smtClean="0"/>
-              <a:t>.</a:t>
+              <a:t>The issue is attempt to send message after stop signal will result in exception what is probably not what we want.</a:t>
             </a:r>
             <a:endParaRPr lang="en-US" dirty="0" smtClean="0"/>
           </a:p>
@@ -2654,15 +2638,7 @@
             </a:r>
             <a:r>
               <a:rPr lang="en-US" baseline="0" dirty="0" smtClean="0"/>
-              <a:t> Message is sent on broker and then gets processed by Document Processor, </a:t>
-            </a:r>
-            <a:r>
-              <a:rPr lang="en-US" baseline="0" dirty="0" smtClean="0"/>
-              <a:t>which </a:t>
-            </a:r>
-            <a:r>
-              <a:rPr lang="en-US" baseline="0" dirty="0" smtClean="0"/>
-              <a:t>send another message </a:t>
+              <a:t> Message is sent on broker and then gets processed by Document Processor, which send another message </a:t>
             </a:r>
             <a:r>
               <a:rPr lang="en-US" baseline="0" dirty="0" err="1" smtClean="0"/>
@@ -2896,11 +2872,7 @@
             </a:r>
             <a:r>
               <a:rPr lang="en-US" baseline="0" dirty="0" smtClean="0"/>
-              <a:t> message we will get an </a:t>
-            </a:r>
-            <a:r>
-              <a:rPr lang="en-US" baseline="0" dirty="0" smtClean="0"/>
-              <a:t>exception</a:t>
+              <a:t> message we will get an exception</a:t>
             </a:r>
           </a:p>
           <a:p>
@@ -3035,30 +3007,13 @@
             </a:r>
             <a:r>
               <a:rPr lang="en-US" baseline="0" dirty="0" smtClean="0"/>
-              <a:t> on broker, but won’t be </a:t>
-            </a:r>
+              <a:t> on broker, but won’t be consumed because we are shutting down. </a:t>
+            </a:r>
+          </a:p>
+          <a:p>
             <a:r>
               <a:rPr lang="en-US" baseline="0" dirty="0" smtClean="0"/>
-              <a:t>consumed because </a:t>
-            </a:r>
-            <a:r>
-              <a:rPr lang="en-US" baseline="0" dirty="0" smtClean="0"/>
-              <a:t>we are shutting down. </a:t>
-            </a:r>
-            <a:endParaRPr lang="en-US" baseline="0" dirty="0" smtClean="0"/>
-          </a:p>
-          <a:p>
-            <a:r>
-              <a:rPr lang="en-US" baseline="0" dirty="0" smtClean="0"/>
-              <a:t>It </a:t>
-            </a:r>
-            <a:r>
-              <a:rPr lang="en-US" baseline="0" dirty="0" smtClean="0"/>
-              <a:t>will be processed either on another host in another consumer or on this host when we start consumer </a:t>
-            </a:r>
-            <a:r>
-              <a:rPr lang="en-US" baseline="0" dirty="0" smtClean="0"/>
-              <a:t>again</a:t>
+              <a:t>It will be processed either on another host in another consumer or on this host when we start consumer again</a:t>
             </a:r>
           </a:p>
           <a:p>
@@ -3161,15 +3116,7 @@
             </a:r>
             <a:r>
               <a:rPr lang="en-US" baseline="0" dirty="0" smtClean="0"/>
-              <a:t> solve following issue. You want your application to consume files from ftp. This means, read file, process it, delete it. Most probably, if you care about reliability, you have 2 instances of this application for failover. If there are two of them, they work in parallel and may read and process the same file at the same time. This is not what we want. What we want, to have only one </a:t>
-            </a:r>
-            <a:r>
-              <a:rPr lang="en-US" baseline="0" dirty="0" smtClean="0"/>
-              <a:t>consumer active</a:t>
-            </a:r>
-            <a:r>
-              <a:rPr lang="en-US" baseline="0" dirty="0" smtClean="0"/>
-              <a:t>, another should be inactive in this case. </a:t>
+              <a:t> solve following issue. You want your application to consume files from ftp. This means, read file, process it, delete it. Most probably, if you care about reliability, you have 2 instances of this application for failover. If there are two of them, they work in parallel and may read and process the same file at the same time. This is not what we want. What we want, to have only one consumer active, another should be inactive in this case. </a:t>
             </a:r>
           </a:p>
           <a:p>
@@ -3274,11 +3221,7 @@
             </a:r>
             <a:r>
               <a:rPr lang="en-US" baseline="0" dirty="0" smtClean="0"/>
-              <a:t> can just disable the consuming functionality on one host with help of configuration property (so the whole ftp consuming is turned </a:t>
-            </a:r>
-            <a:r>
-              <a:rPr lang="en-US" baseline="0" dirty="0" smtClean="0"/>
-              <a:t>off on that host)</a:t>
+              <a:t> can just disable the consuming functionality on one host with help of configuration property (so the whole ftp consuming is turned off on that host)</a:t>
             </a:r>
             <a:endParaRPr lang="ru-RU" dirty="0"/>
           </a:p>
@@ -3371,15 +3314,7 @@
             </a:r>
             <a:r>
               <a:rPr lang="en-US" baseline="0" dirty="0" smtClean="0"/>
-              <a:t> if the remaining host goes down, nobody is </a:t>
-            </a:r>
-            <a:r>
-              <a:rPr lang="en-US" baseline="0" dirty="0" smtClean="0"/>
-              <a:t>looking into ftp server – </a:t>
-            </a:r>
-            <a:r>
-              <a:rPr lang="en-US" baseline="0" dirty="0" smtClean="0"/>
-              <a:t>so why we ever cared for two hosts and failover?</a:t>
+              <a:t> if the remaining host goes down, nobody is looking into ftp server – so why we ever cared for two hosts and failover?</a:t>
             </a:r>
             <a:endParaRPr lang="ru-RU" dirty="0"/>
           </a:p>
@@ -3985,15 +3920,7 @@
           <a:p>
             <a:r>
               <a:rPr lang="en-US" baseline="0" dirty="0" smtClean="0"/>
-              <a:t>What </a:t>
-            </a:r>
-            <a:r>
-              <a:rPr lang="en-US" baseline="0" dirty="0" smtClean="0"/>
-              <a:t>parts would you test</a:t>
-            </a:r>
-            <a:r>
-              <a:rPr lang="en-US" baseline="0" dirty="0" smtClean="0"/>
-              <a:t>?</a:t>
+              <a:t>What parts would you test?</a:t>
             </a:r>
             <a:endParaRPr lang="ru-RU" dirty="0"/>
           </a:p>
@@ -4170,11 +4097,7 @@
           <a:p>
             <a:r>
               <a:rPr lang="en-US" baseline="0" dirty="0" smtClean="0"/>
-              <a:t>But developer writes routes as well, so it would be nice to test them too. And if routes involve broker, it would be nice to use it too to check correct </a:t>
-            </a:r>
-            <a:r>
-              <a:rPr lang="en-US" baseline="0" dirty="0" smtClean="0"/>
-              <a:t>integration. And it would be nice to run broker in some embedded mode</a:t>
+              <a:t>But developer writes routes as well, so it would be nice to test them too. And if routes involve broker, it would be nice to use it too to check correct integration. And it would be nice to run broker in some embedded mode</a:t>
             </a:r>
             <a:endParaRPr lang="ru-RU" dirty="0"/>
           </a:p>
@@ -4972,29 +4895,17 @@
           <a:p>
             <a:r>
               <a:rPr lang="en-US" dirty="0" smtClean="0"/>
-              <a:t>It’s </a:t>
-            </a:r>
-            <a:r>
-              <a:rPr lang="en-US" dirty="0" smtClean="0"/>
-              <a:t>usually </a:t>
+              <a:t>It’s usually </a:t>
             </a:r>
             <a:r>
               <a:rPr lang="en-US" baseline="0" dirty="0" smtClean="0"/>
-              <a:t>used </a:t>
-            </a:r>
+              <a:t>used if the request processing requires significant time or high load.</a:t>
+            </a:r>
+          </a:p>
+          <a:p>
             <a:r>
               <a:rPr lang="en-US" baseline="0" dirty="0" smtClean="0"/>
-              <a:t>if the request processing requires significant time or high load.</a:t>
-            </a:r>
-          </a:p>
-          <a:p>
-            <a:r>
-              <a:rPr lang="en-US" baseline="0" dirty="0" smtClean="0"/>
-              <a:t>User gets immediate answer like “Your request is accepted” and all the hard work executed in background. And on completion, user is notified </a:t>
-            </a:r>
-            <a:r>
-              <a:rPr lang="en-US" baseline="0" dirty="0" smtClean="0"/>
-              <a:t>by email for example</a:t>
+              <a:t>User gets immediate answer like “Your request is accepted” and all the hard work executed in background. And on completion, user is notified by email for example</a:t>
             </a:r>
             <a:endParaRPr lang="ru-RU" baseline="0" dirty="0" smtClean="0"/>
           </a:p>
@@ -5219,15 +5130,7 @@
             </a:pPr>
             <a:r>
               <a:rPr lang="en-US" b="0" baseline="0" dirty="0" smtClean="0"/>
-              <a:t>Usually producer generates message </a:t>
-            </a:r>
-            <a:r>
-              <a:rPr lang="en-US" b="0" baseline="0" dirty="0" smtClean="0"/>
-              <a:t>faster than </a:t>
-            </a:r>
-            <a:r>
-              <a:rPr lang="en-US" b="0" baseline="0" dirty="0" smtClean="0"/>
-              <a:t>consumer can process it, so to keep consuming messages at the same speed as producing them, we can add more consumers that will run in parallel</a:t>
+              <a:t>Usually producer generates message faster than consumer can process it, so to keep consuming messages at the same speed as producing them, we can add more consumers that will run in parallel</a:t>
             </a:r>
           </a:p>
           <a:p>
@@ -11116,8 +11019,13 @@
           <a:p>
             <a:r>
               <a:rPr lang="en-US" sz="3200" dirty="0" smtClean="0"/>
-              <a:t>On</a:t>
-            </a:r>
+              <a:t>i</a:t>
+            </a:r>
+            <a:r>
+              <a:rPr lang="en-US" sz="3200" dirty="0" smtClean="0"/>
+              <a:t>n</a:t>
+            </a:r>
+            <a:endParaRPr lang="en-US" sz="3200" dirty="0" smtClean="0"/>
           </a:p>
           <a:p>
             <a:r>
@@ -32233,15 +32141,6 @@
 </file>
 
 <file path=customXml/item1.xml><?xml version="1.0" encoding="utf-8"?>
-<?mso-contentType ?>
-<FormTemplates xmlns="http://schemas.microsoft.com/sharepoint/v3/contenttype/forms">
-  <Display>DocumentLibraryForm</Display>
-  <Edit>DocumentLibraryForm</Edit>
-  <New>DocumentLibraryForm</New>
-</FormTemplates>
-</file>
-
-<file path=customXml/item2.xml><?xml version="1.0" encoding="utf-8"?>
 <ct:contentTypeSchema xmlns:ct="http://schemas.microsoft.com/office/2006/metadata/contentType" xmlns:ma="http://schemas.microsoft.com/office/2006/metadata/properties/metaAttributes" ct:_="" ma:_="" ma:contentTypeName="Document" ma:contentTypeID="0x010100B0E9A4A7D20EA84CAA39F80EA2A19865" ma:contentTypeVersion="1" ma:contentTypeDescription="Create a new document." ma:contentTypeScope="" ma:versionID="4ed0c655cf5595f31b06ef1418ca28bf">
   <xsd:schema xmlns:xsd="http://www.w3.org/2001/XMLSchema" xmlns:xs="http://www.w3.org/2001/XMLSchema" xmlns:p="http://schemas.microsoft.com/office/2006/metadata/properties" xmlns:ns1="http://schemas.microsoft.com/sharepoint/v3" targetNamespace="http://schemas.microsoft.com/office/2006/metadata/properties" ma:root="true" ma:fieldsID="4dcce58c87e9fcebab8021569449a8d0" ns1:_="">
     <xsd:import namespace="http://schemas.microsoft.com/sharepoint/v3"/>
@@ -32373,7 +32272,7 @@
 </ct:contentTypeSchema>
 </file>
 
-<file path=customXml/item3.xml><?xml version="1.0" encoding="utf-8"?>
+<file path=customXml/item2.xml><?xml version="1.0" encoding="utf-8"?>
 <p:properties xmlns:p="http://schemas.microsoft.com/office/2006/metadata/properties" xmlns:xsi="http://www.w3.org/2001/XMLSchema-instance" xmlns:pc="http://schemas.microsoft.com/office/infopath/2007/PartnerControls">
   <documentManagement>
     <PublishingExpirationDate xmlns="http://schemas.microsoft.com/sharepoint/v3" xsi:nil="true"/>
@@ -32382,15 +32281,16 @@
 </p:properties>
 </file>
 
-<file path=customXml/itemProps1.xml><?xml version="1.0" encoding="utf-8"?>
-<ds:datastoreItem xmlns:ds="http://schemas.openxmlformats.org/officeDocument/2006/customXml" ds:itemID="{14883F0F-DE57-4ECA-B9BB-F22E8C5B5D82}">
-  <ds:schemaRefs>
-    <ds:schemaRef ds:uri="http://schemas.microsoft.com/sharepoint/v3/contenttype/forms"/>
-  </ds:schemaRefs>
-</ds:datastoreItem>
+<file path=customXml/item3.xml><?xml version="1.0" encoding="utf-8"?>
+<?mso-contentType ?>
+<FormTemplates xmlns="http://schemas.microsoft.com/sharepoint/v3/contenttype/forms">
+  <Display>DocumentLibraryForm</Display>
+  <Edit>DocumentLibraryForm</Edit>
+  <New>DocumentLibraryForm</New>
+</FormTemplates>
 </file>
 
-<file path=customXml/itemProps2.xml><?xml version="1.0" encoding="utf-8"?>
+<file path=customXml/itemProps1.xml><?xml version="1.0" encoding="utf-8"?>
 <ds:datastoreItem xmlns:ds="http://schemas.openxmlformats.org/officeDocument/2006/customXml" ds:itemID="{C3A1A37E-F8E3-427A-BCE9-B1DDB8B96CDF}">
   <ds:schemaRefs>
     <ds:schemaRef ds:uri="http://schemas.microsoft.com/office/2006/metadata/contentType"/>
@@ -32408,7 +32308,7 @@
 </ds:datastoreItem>
 </file>
 
-<file path=customXml/itemProps3.xml><?xml version="1.0" encoding="utf-8"?>
+<file path=customXml/itemProps2.xml><?xml version="1.0" encoding="utf-8"?>
 <ds:datastoreItem xmlns:ds="http://schemas.openxmlformats.org/officeDocument/2006/customXml" ds:itemID="{D5E3C081-4081-47AD-A9A6-9F18F525DA1D}">
   <ds:schemaRefs>
     <ds:schemaRef ds:uri="http://schemas.microsoft.com/office/2006/documentManagement/types"/>
@@ -32422,4 +32322,12 @@
     <ds:schemaRef ds:uri="http://purl.org/dc/elements/1.1/"/>
   </ds:schemaRefs>
 </ds:datastoreItem>
+</file>
+
+<file path=customXml/itemProps3.xml><?xml version="1.0" encoding="utf-8"?>
+<ds:datastoreItem xmlns:ds="http://schemas.openxmlformats.org/officeDocument/2006/customXml" ds:itemID="{14883F0F-DE57-4ECA-B9BB-F22E8C5B5D82}">
+  <ds:schemaRefs>
+    <ds:schemaRef ds:uri="http://schemas.microsoft.com/sharepoint/v3/contenttype/forms"/>
+  </ds:schemaRefs>
+</ds:datastoreItem>
 </file>
</xml_diff>